<commit_message>
More final report stuff. I think we also fixed a bug, somewhere. And added arbitrary backend import support.
git-svn-id: https://svn.cs.hmc.edu/cs181b/fall11/ours/hsaxberg-jhester@885 b3dceee4-e711-448b-9f10-89700535f856
</commit_message>
<xml_diff>
--- a/Project Plan/Non-Relational Database Language.pptx
+++ b/Project Plan/Non-Relational Database Language.pptx
@@ -15,7 +15,10 @@
     <p:sldId id="263" r:id="rId9"/>
     <p:sldId id="264" r:id="rId10"/>
     <p:sldId id="265" r:id="rId11"/>
-    <p:sldId id="260" r:id="rId12"/>
+    <p:sldId id="268" r:id="rId12"/>
+    <p:sldId id="269" r:id="rId13"/>
+    <p:sldId id="270" r:id="rId14"/>
+    <p:sldId id="260" r:id="rId15"/>
   </p:sldIdLst>
   <p:sldSz cx="9144000" cy="6858000" type="screen4x3"/>
   <p:notesSz cx="6858000" cy="9144000"/>
@@ -370,7 +373,7 @@
           <a:p>
             <a:fld id="{28859939-D2F4-4A7F-B967-918ECC7678F1}" type="datetimeFigureOut">
               <a:rPr lang="en-US" smtClean="0"/>
-              <a:t>11/27/2011</a:t>
+              <a:t>11/28/2011</a:t>
             </a:fld>
             <a:endParaRPr lang="en-US"/>
           </a:p>
@@ -583,7 +586,7 @@
           <a:p>
             <a:fld id="{28859939-D2F4-4A7F-B967-918ECC7678F1}" type="datetimeFigureOut">
               <a:rPr lang="en-US" smtClean="0"/>
-              <a:t>11/27/2011</a:t>
+              <a:t>11/28/2011</a:t>
             </a:fld>
             <a:endParaRPr lang="en-US"/>
           </a:p>
@@ -850,7 +853,7 @@
           <a:p>
             <a:fld id="{28859939-D2F4-4A7F-B967-918ECC7678F1}" type="datetimeFigureOut">
               <a:rPr lang="en-US" smtClean="0"/>
-              <a:t>11/27/2011</a:t>
+              <a:t>11/28/2011</a:t>
             </a:fld>
             <a:endParaRPr lang="en-US"/>
           </a:p>
@@ -1000,7 +1003,7 @@
           <a:p>
             <a:fld id="{28859939-D2F4-4A7F-B967-918ECC7678F1}" type="datetimeFigureOut">
               <a:rPr lang="en-US" smtClean="0"/>
-              <a:t>11/27/2011</a:t>
+              <a:t>11/28/2011</a:t>
             </a:fld>
             <a:endParaRPr lang="en-US"/>
           </a:p>
@@ -1330,7 +1333,7 @@
           <a:p>
             <a:fld id="{28859939-D2F4-4A7F-B967-918ECC7678F1}" type="datetimeFigureOut">
               <a:rPr lang="en-US" smtClean="0"/>
-              <a:t>11/27/2011</a:t>
+              <a:t>11/28/2011</a:t>
             </a:fld>
             <a:endParaRPr lang="en-US"/>
           </a:p>
@@ -1638,7 +1641,7 @@
           <a:p>
             <a:fld id="{28859939-D2F4-4A7F-B967-918ECC7678F1}" type="datetimeFigureOut">
               <a:rPr lang="en-US" smtClean="0"/>
-              <a:t>11/27/2011</a:t>
+              <a:t>11/28/2011</a:t>
             </a:fld>
             <a:endParaRPr lang="en-US"/>
           </a:p>
@@ -2059,7 +2062,7 @@
           <a:p>
             <a:fld id="{28859939-D2F4-4A7F-B967-918ECC7678F1}" type="datetimeFigureOut">
               <a:rPr lang="en-US" smtClean="0"/>
-              <a:t>11/27/2011</a:t>
+              <a:t>11/28/2011</a:t>
             </a:fld>
             <a:endParaRPr lang="en-US"/>
           </a:p>
@@ -2172,7 +2175,7 @@
           <a:p>
             <a:fld id="{28859939-D2F4-4A7F-B967-918ECC7678F1}" type="datetimeFigureOut">
               <a:rPr lang="en-US" smtClean="0"/>
-              <a:t>11/27/2011</a:t>
+              <a:t>11/28/2011</a:t>
             </a:fld>
             <a:endParaRPr lang="en-US"/>
           </a:p>
@@ -2331,7 +2334,7 @@
           <a:p>
             <a:fld id="{28859939-D2F4-4A7F-B967-918ECC7678F1}" type="datetimeFigureOut">
               <a:rPr lang="en-US" smtClean="0"/>
-              <a:t>11/27/2011</a:t>
+              <a:t>11/28/2011</a:t>
             </a:fld>
             <a:endParaRPr lang="en-US"/>
           </a:p>
@@ -2715,7 +2718,7 @@
           <a:p>
             <a:fld id="{28859939-D2F4-4A7F-B967-918ECC7678F1}" type="datetimeFigureOut">
               <a:rPr lang="en-US" smtClean="0"/>
-              <a:t>11/27/2011</a:t>
+              <a:t>11/28/2011</a:t>
             </a:fld>
             <a:endParaRPr lang="en-US"/>
           </a:p>
@@ -3077,7 +3080,7 @@
           <a:p>
             <a:fld id="{28859939-D2F4-4A7F-B967-918ECC7678F1}" type="datetimeFigureOut">
               <a:rPr lang="en-US" smtClean="0"/>
-              <a:t>11/27/2011</a:t>
+              <a:t>11/28/2011</a:t>
             </a:fld>
             <a:endParaRPr lang="en-US"/>
           </a:p>
@@ -3411,7 +3414,7 @@
           <a:p>
             <a:fld id="{28859939-D2F4-4A7F-B967-918ECC7678F1}" type="datetimeFigureOut">
               <a:rPr lang="en-US" smtClean="0"/>
-              <a:t>11/27/2011</a:t>
+              <a:t>11/28/2011</a:t>
             </a:fld>
             <a:endParaRPr lang="en-US"/>
           </a:p>
@@ -3945,9 +3948,10 @@
           <a:lstStyle/>
           <a:p>
             <a:r>
-              <a:rPr lang="en-US" sz="6600" dirty="0" smtClean="0"/>
-              <a:t>Demo!</a:t>
-            </a:r>
+              <a:rPr lang="en-US" sz="6600" smtClean="0"/>
+              <a:t>Code!</a:t>
+            </a:r>
+            <a:endParaRPr lang="en-US" sz="6600" dirty="0" smtClean="0"/>
           </a:p>
           <a:p>
             <a:pPr lvl="1"/>
@@ -4011,6 +4015,354 @@
 </file>
 
 <file path=ppt/slides/slide11.xml><?xml version="1.0" encoding="utf-8"?>
+<p:sld xmlns:a="http://schemas.openxmlformats.org/drawingml/2006/main" xmlns:r="http://schemas.openxmlformats.org/officeDocument/2006/relationships" xmlns:p="http://schemas.openxmlformats.org/presentationml/2006/main">
+  <p:cSld>
+    <p:spTree>
+      <p:nvGrpSpPr>
+        <p:cNvPr id="1" name=""/>
+        <p:cNvGrpSpPr/>
+        <p:nvPr/>
+      </p:nvGrpSpPr>
+      <p:grpSpPr>
+        <a:xfrm>
+          <a:off x="0" y="0"/>
+          <a:ext cx="0" cy="0"/>
+          <a:chOff x="0" y="0"/>
+          <a:chExt cx="0" cy="0"/>
+        </a:xfrm>
+      </p:grpSpPr>
+      <p:pic>
+        <p:nvPicPr>
+          <p:cNvPr id="4" name="Content Placeholder 3"/>
+          <p:cNvPicPr>
+            <a:picLocks noGrp="1" noChangeAspect="1"/>
+          </p:cNvPicPr>
+          <p:nvPr>
+            <p:ph type="pic" idx="1"/>
+          </p:nvPr>
+        </p:nvPicPr>
+        <p:blipFill rotWithShape="1">
+          <a:blip r:embed="rId2">
+            <a:extLst>
+              <a:ext uri="{28A0092B-C50C-407E-A947-70E740481C1C}">
+                <a14:useLocalDpi xmlns:a14="http://schemas.microsoft.com/office/drawing/2010/main" val="0"/>
+              </a:ext>
+            </a:extLst>
+          </a:blip>
+          <a:srcRect l="-2508" t="232" r="66318" b="65046"/>
+          <a:stretch/>
+        </p:blipFill>
+        <p:spPr>
+          <a:xfrm>
+            <a:off x="-152400" y="124690"/>
+            <a:ext cx="7010400" cy="2389909"/>
+          </a:xfrm>
+        </p:spPr>
+      </p:pic>
+      <p:sp>
+        <p:nvSpPr>
+          <p:cNvPr id="6" name="Text Placeholder 5"/>
+          <p:cNvSpPr>
+            <a:spLocks noGrp="1"/>
+          </p:cNvSpPr>
+          <p:nvPr>
+            <p:ph type="body" sz="half" idx="2"/>
+          </p:nvPr>
+        </p:nvSpPr>
+        <p:spPr/>
+        <p:txBody>
+          <a:bodyPr/>
+          <a:lstStyle/>
+          <a:p>
+            <a:r>
+              <a:rPr lang="en-US" dirty="0" smtClean="0"/>
+              <a:t>A model with on-the-fly fields</a:t>
+            </a:r>
+            <a:endParaRPr lang="en-US" dirty="0"/>
+          </a:p>
+        </p:txBody>
+      </p:sp>
+      <p:sp>
+        <p:nvSpPr>
+          <p:cNvPr id="5" name="Title 4"/>
+          <p:cNvSpPr>
+            <a:spLocks noGrp="1"/>
+          </p:cNvSpPr>
+          <p:nvPr>
+            <p:ph type="title"/>
+          </p:nvPr>
+        </p:nvSpPr>
+        <p:spPr/>
+        <p:txBody>
+          <a:bodyPr/>
+          <a:lstStyle/>
+          <a:p>
+            <a:r>
+              <a:rPr lang="en-US" dirty="0" smtClean="0"/>
+              <a:t>putting</a:t>
+            </a:r>
+            <a:endParaRPr lang="en-US" dirty="0"/>
+          </a:p>
+        </p:txBody>
+      </p:sp>
+      <p:pic>
+        <p:nvPicPr>
+          <p:cNvPr id="7" name="Picture 6"/>
+          <p:cNvPicPr>
+            <a:picLocks noChangeAspect="1"/>
+          </p:cNvPicPr>
+          <p:nvPr/>
+        </p:nvPicPr>
+        <p:blipFill rotWithShape="1">
+          <a:blip r:embed="rId2">
+            <a:extLst>
+              <a:ext uri="{28A0092B-C50C-407E-A947-70E740481C1C}">
+                <a14:useLocalDpi xmlns:a14="http://schemas.microsoft.com/office/drawing/2010/main" val="0"/>
+              </a:ext>
+            </a:extLst>
+          </a:blip>
+          <a:srcRect l="35006" r="1000"/>
+          <a:stretch/>
+        </p:blipFill>
+        <p:spPr>
+          <a:xfrm>
+            <a:off x="270510" y="2895600"/>
+            <a:ext cx="6679474" cy="3691288"/>
+          </a:xfrm>
+          <a:prstGeom prst="rect">
+            <a:avLst/>
+          </a:prstGeom>
+        </p:spPr>
+      </p:pic>
+    </p:spTree>
+    <p:extLst>
+      <p:ext uri="{BB962C8B-B14F-4D97-AF65-F5344CB8AC3E}">
+        <p14:creationId xmlns:p14="http://schemas.microsoft.com/office/powerpoint/2010/main" val="3482546613"/>
+      </p:ext>
+    </p:extLst>
+  </p:cSld>
+  <p:clrMapOvr>
+    <a:masterClrMapping/>
+  </p:clrMapOvr>
+  <p:timing>
+    <p:tnLst>
+      <p:par>
+        <p:cTn id="1" dur="indefinite" restart="never" nodeType="tmRoot"/>
+      </p:par>
+    </p:tnLst>
+  </p:timing>
+</p:sld>
+</file>
+
+<file path=ppt/slides/slide12.xml><?xml version="1.0" encoding="utf-8"?>
+<p:sld xmlns:a="http://schemas.openxmlformats.org/drawingml/2006/main" xmlns:r="http://schemas.openxmlformats.org/officeDocument/2006/relationships" xmlns:p="http://schemas.openxmlformats.org/presentationml/2006/main">
+  <p:cSld>
+    <p:spTree>
+      <p:nvGrpSpPr>
+        <p:cNvPr id="1" name=""/>
+        <p:cNvGrpSpPr/>
+        <p:nvPr/>
+      </p:nvGrpSpPr>
+      <p:grpSpPr>
+        <a:xfrm>
+          <a:off x="0" y="0"/>
+          <a:ext cx="0" cy="0"/>
+          <a:chOff x="0" y="0"/>
+          <a:chExt cx="0" cy="0"/>
+        </a:xfrm>
+      </p:grpSpPr>
+      <p:pic>
+        <p:nvPicPr>
+          <p:cNvPr id="5" name="Picture Placeholder 4"/>
+          <p:cNvPicPr>
+            <a:picLocks noGrp="1" noChangeAspect="1"/>
+          </p:cNvPicPr>
+          <p:nvPr>
+            <p:ph type="pic" idx="1"/>
+          </p:nvPr>
+        </p:nvPicPr>
+        <p:blipFill rotWithShape="1">
+          <a:blip r:embed="rId2">
+            <a:extLst>
+              <a:ext uri="{28A0092B-C50C-407E-A947-70E740481C1C}">
+                <a14:useLocalDpi xmlns:a14="http://schemas.microsoft.com/office/drawing/2010/main" val="0"/>
+              </a:ext>
+            </a:extLst>
+          </a:blip>
+          <a:srcRect l="-1422" r="65298"/>
+          <a:stretch/>
+        </p:blipFill>
+        <p:spPr>
+          <a:xfrm>
+            <a:off x="457200" y="304800"/>
+            <a:ext cx="6382016" cy="6236970"/>
+          </a:xfrm>
+        </p:spPr>
+      </p:pic>
+      <p:sp>
+        <p:nvSpPr>
+          <p:cNvPr id="3" name="Text Placeholder 2"/>
+          <p:cNvSpPr>
+            <a:spLocks noGrp="1"/>
+          </p:cNvSpPr>
+          <p:nvPr>
+            <p:ph type="body" sz="half" idx="2"/>
+          </p:nvPr>
+        </p:nvSpPr>
+        <p:spPr/>
+        <p:txBody>
+          <a:bodyPr/>
+          <a:lstStyle/>
+          <a:p>
+            <a:r>
+              <a:rPr lang="en-US" dirty="0" smtClean="0"/>
+              <a:t>A model instance (or instances) from the database</a:t>
+            </a:r>
+            <a:endParaRPr lang="en-US" dirty="0"/>
+          </a:p>
+        </p:txBody>
+      </p:sp>
+      <p:sp>
+        <p:nvSpPr>
+          <p:cNvPr id="4" name="Title 3"/>
+          <p:cNvSpPr>
+            <a:spLocks noGrp="1"/>
+          </p:cNvSpPr>
+          <p:nvPr>
+            <p:ph type="title"/>
+          </p:nvPr>
+        </p:nvSpPr>
+        <p:spPr/>
+        <p:txBody>
+          <a:bodyPr/>
+          <a:lstStyle/>
+          <a:p>
+            <a:r>
+              <a:rPr lang="en-US" dirty="0" smtClean="0"/>
+              <a:t>Getting</a:t>
+            </a:r>
+            <a:endParaRPr lang="en-US" dirty="0"/>
+          </a:p>
+        </p:txBody>
+      </p:sp>
+    </p:spTree>
+    <p:extLst>
+      <p:ext uri="{BB962C8B-B14F-4D97-AF65-F5344CB8AC3E}">
+        <p14:creationId xmlns:p14="http://schemas.microsoft.com/office/powerpoint/2010/main" val="574621893"/>
+      </p:ext>
+    </p:extLst>
+  </p:cSld>
+  <p:clrMapOvr>
+    <a:masterClrMapping/>
+  </p:clrMapOvr>
+</p:sld>
+</file>
+
+<file path=ppt/slides/slide13.xml><?xml version="1.0" encoding="utf-8"?>
+<p:sld xmlns:a="http://schemas.openxmlformats.org/drawingml/2006/main" xmlns:r="http://schemas.openxmlformats.org/officeDocument/2006/relationships" xmlns:p="http://schemas.openxmlformats.org/presentationml/2006/main">
+  <p:cSld>
+    <p:spTree>
+      <p:nvGrpSpPr>
+        <p:cNvPr id="1" name=""/>
+        <p:cNvGrpSpPr/>
+        <p:nvPr/>
+      </p:nvGrpSpPr>
+      <p:grpSpPr>
+        <a:xfrm>
+          <a:off x="0" y="0"/>
+          <a:ext cx="0" cy="0"/>
+          <a:chOff x="0" y="0"/>
+          <a:chExt cx="0" cy="0"/>
+        </a:xfrm>
+      </p:grpSpPr>
+      <p:pic>
+        <p:nvPicPr>
+          <p:cNvPr id="5" name="Picture Placeholder 4"/>
+          <p:cNvPicPr>
+            <a:picLocks noGrp="1" noChangeAspect="1"/>
+          </p:cNvPicPr>
+          <p:nvPr>
+            <p:ph type="pic" idx="1"/>
+          </p:nvPr>
+        </p:nvPicPr>
+        <p:blipFill rotWithShape="1">
+          <a:blip r:embed="rId2">
+            <a:extLst>
+              <a:ext uri="{28A0092B-C50C-407E-A947-70E740481C1C}">
+                <a14:useLocalDpi xmlns:a14="http://schemas.microsoft.com/office/drawing/2010/main" val="0"/>
+              </a:ext>
+            </a:extLst>
+          </a:blip>
+          <a:srcRect l="-1583" r="65212"/>
+          <a:stretch/>
+        </p:blipFill>
+        <p:spPr>
+          <a:xfrm>
+            <a:off x="0" y="152400"/>
+            <a:ext cx="6705600" cy="6553200"/>
+          </a:xfrm>
+        </p:spPr>
+      </p:pic>
+      <p:sp>
+        <p:nvSpPr>
+          <p:cNvPr id="3" name="Text Placeholder 2"/>
+          <p:cNvSpPr>
+            <a:spLocks noGrp="1"/>
+          </p:cNvSpPr>
+          <p:nvPr>
+            <p:ph type="body" sz="half" idx="2"/>
+          </p:nvPr>
+        </p:nvSpPr>
+        <p:spPr/>
+        <p:txBody>
+          <a:bodyPr/>
+          <a:lstStyle/>
+          <a:p>
+            <a:r>
+              <a:rPr lang="en-US" dirty="0" smtClean="0"/>
+              <a:t>A model with arbitrary initial fields and values</a:t>
+            </a:r>
+            <a:endParaRPr lang="en-US" dirty="0"/>
+          </a:p>
+        </p:txBody>
+      </p:sp>
+      <p:sp>
+        <p:nvSpPr>
+          <p:cNvPr id="4" name="Title 3"/>
+          <p:cNvSpPr>
+            <a:spLocks noGrp="1"/>
+          </p:cNvSpPr>
+          <p:nvPr>
+            <p:ph type="title"/>
+          </p:nvPr>
+        </p:nvSpPr>
+        <p:spPr/>
+        <p:txBody>
+          <a:bodyPr/>
+          <a:lstStyle/>
+          <a:p>
+            <a:r>
+              <a:rPr lang="en-US" dirty="0" smtClean="0"/>
+              <a:t>Creating</a:t>
+            </a:r>
+            <a:endParaRPr lang="en-US" dirty="0"/>
+          </a:p>
+        </p:txBody>
+      </p:sp>
+    </p:spTree>
+    <p:extLst>
+      <p:ext uri="{BB962C8B-B14F-4D97-AF65-F5344CB8AC3E}">
+        <p14:creationId xmlns:p14="http://schemas.microsoft.com/office/powerpoint/2010/main" val="1059565958"/>
+      </p:ext>
+    </p:extLst>
+  </p:cSld>
+  <p:clrMapOvr>
+    <a:masterClrMapping/>
+  </p:clrMapOvr>
+</p:sld>
+</file>
+
+<file path=ppt/slides/slide14.xml><?xml version="1.0" encoding="utf-8"?>
 <p:sld xmlns:a="http://schemas.openxmlformats.org/drawingml/2006/main" xmlns:r="http://schemas.openxmlformats.org/officeDocument/2006/relationships" xmlns:p="http://schemas.openxmlformats.org/presentationml/2006/main">
   <p:cSld>
     <p:spTree>
@@ -4370,15 +4722,7 @@
           <a:p>
             <a:r>
               <a:rPr lang="en-US" sz="2100" dirty="0" smtClean="0"/>
-              <a:t>Can be more </a:t>
-            </a:r>
-            <a:r>
-              <a:rPr lang="en-US" sz="2100" dirty="0" smtClean="0"/>
-              <a:t>flexible/scalable </a:t>
-            </a:r>
-            <a:r>
-              <a:rPr lang="en-US" sz="2100" dirty="0" smtClean="0"/>
-              <a:t>than relational databases</a:t>
+              <a:t>Can be more flexible/scalable than relational databases</a:t>
             </a:r>
           </a:p>
         </p:txBody>
@@ -4674,15 +5018,7 @@
             </a:pPr>
             <a:r>
               <a:rPr lang="en-US" dirty="0" smtClean="0"/>
-              <a:t>Converts between </a:t>
-            </a:r>
-            <a:r>
-              <a:rPr lang="en-US" dirty="0" smtClean="0"/>
-              <a:t>native Python types and database-aware types (e.g</a:t>
-            </a:r>
-            <a:r>
-              <a:rPr lang="en-US" dirty="0" smtClean="0"/>
-              <a:t>. Integer to </a:t>
+              <a:t>Converts between native Python types and database-aware types (e.g. Integer to </a:t>
             </a:r>
             <a:r>
               <a:rPr lang="en-US" dirty="0" err="1" smtClean="0"/>

</xml_diff>